<commit_message>
temporary power pellets, reflection toggle button added
</commit_message>
<xml_diff>
--- a/3D Pacman - mid term.pptx
+++ b/3D Pacman - mid term.pptx
@@ -105,6 +105,11 @@
       </a:defRPr>
     </a:lvl9pPr>
   </p:defaultTextStyle>
+  <p:extLst>
+    <p:ext uri="{EFAFB233-063F-42B5-8137-9DF3F51BA10A}">
+      <p15:sldGuideLst xmlns:p15="http://schemas.microsoft.com/office/powerpoint/2012/main"/>
+    </p:ext>
+  </p:extLst>
 </p:presentation>
 </file>
 
@@ -831,7 +836,7 @@
             <a:fld id="{B61BEF0D-F0BB-DE4B-95CE-6DB70DBA9567}" type="datetimeFigureOut">
               <a:rPr lang="en-US" dirty="0"/>
               <a:pPr/>
-              <a:t>31-Oct-13</a:t>
+              <a:t>11/1/2013</a:t>
             </a:fld>
             <a:endParaRPr lang="en-US" dirty="0"/>
           </a:p>
@@ -1079,7 +1084,7 @@
             <a:fld id="{B61BEF0D-F0BB-DE4B-95CE-6DB70DBA9567}" type="datetimeFigureOut">
               <a:rPr lang="en-US" dirty="0"/>
               <a:pPr/>
-              <a:t>31-Oct-13</a:t>
+              <a:t>11/1/2013</a:t>
             </a:fld>
             <a:endParaRPr lang="en-US" dirty="0"/>
           </a:p>
@@ -1390,7 +1395,7 @@
             <a:fld id="{B61BEF0D-F0BB-DE4B-95CE-6DB70DBA9567}" type="datetimeFigureOut">
               <a:rPr lang="en-US" dirty="0"/>
               <a:pPr/>
-              <a:t>31-Oct-13</a:t>
+              <a:t>11/1/2013</a:t>
             </a:fld>
             <a:endParaRPr lang="en-US" dirty="0"/>
           </a:p>
@@ -1728,7 +1733,7 @@
             <a:fld id="{B61BEF0D-F0BB-DE4B-95CE-6DB70DBA9567}" type="datetimeFigureOut">
               <a:rPr lang="en-US" dirty="0"/>
               <a:pPr/>
-              <a:t>31-Oct-13</a:t>
+              <a:t>11/1/2013</a:t>
             </a:fld>
             <a:endParaRPr lang="en-US" dirty="0"/>
           </a:p>
@@ -2039,7 +2044,7 @@
             <a:fld id="{B61BEF0D-F0BB-DE4B-95CE-6DB70DBA9567}" type="datetimeFigureOut">
               <a:rPr lang="en-US" dirty="0"/>
               <a:pPr/>
-              <a:t>31-Oct-13</a:t>
+              <a:t>11/1/2013</a:t>
             </a:fld>
             <a:endParaRPr lang="en-US" dirty="0"/>
           </a:p>
@@ -2429,7 +2434,7 @@
             <a:fld id="{B61BEF0D-F0BB-DE4B-95CE-6DB70DBA9567}" type="datetimeFigureOut">
               <a:rPr lang="en-US" dirty="0"/>
               <a:pPr/>
-              <a:t>31-Oct-13</a:t>
+              <a:t>11/1/2013</a:t>
             </a:fld>
             <a:endParaRPr lang="en-US" dirty="0"/>
           </a:p>
@@ -2595,7 +2600,7 @@
           <a:p>
             <a:fld id="{55C6B4A9-1611-4792-9094-5F34BCA07E0B}" type="datetimeFigureOut">
               <a:rPr lang="en-US" dirty="0"/>
-              <a:t>31-Oct-13</a:t>
+              <a:t>11/1/2013</a:t>
             </a:fld>
             <a:endParaRPr lang="en-US" dirty="0"/>
           </a:p>
@@ -2771,7 +2776,7 @@
             <a:fld id="{B61BEF0D-F0BB-DE4B-95CE-6DB70DBA9567}" type="datetimeFigureOut">
               <a:rPr lang="en-US" dirty="0"/>
               <a:pPr/>
-              <a:t>31-Oct-13</a:t>
+              <a:t>11/1/2013</a:t>
             </a:fld>
             <a:endParaRPr lang="en-US" dirty="0"/>
           </a:p>
@@ -2944,7 +2949,7 @@
             <a:fld id="{B61BEF0D-F0BB-DE4B-95CE-6DB70DBA9567}" type="datetimeFigureOut">
               <a:rPr lang="en-US" dirty="0"/>
               <a:pPr/>
-              <a:t>31-Oct-13</a:t>
+              <a:t>11/1/2013</a:t>
             </a:fld>
             <a:endParaRPr lang="en-US" dirty="0"/>
           </a:p>
@@ -3188,7 +3193,7 @@
             <a:fld id="{B61BEF0D-F0BB-DE4B-95CE-6DB70DBA9567}" type="datetimeFigureOut">
               <a:rPr lang="en-US" dirty="0"/>
               <a:pPr/>
-              <a:t>31-Oct-13</a:t>
+              <a:t>11/1/2013</a:t>
             </a:fld>
             <a:endParaRPr lang="en-US" dirty="0"/>
           </a:p>
@@ -3416,7 +3421,7 @@
           <a:p>
             <a:fld id="{EB712588-04B1-427B-82EE-E8DB90309F08}" type="datetimeFigureOut">
               <a:rPr lang="en-US" dirty="0"/>
-              <a:t>31-Oct-13</a:t>
+              <a:t>11/1/2013</a:t>
             </a:fld>
             <a:endParaRPr lang="en-US" dirty="0"/>
           </a:p>
@@ -3786,7 +3791,7 @@
             <a:fld id="{B61BEF0D-F0BB-DE4B-95CE-6DB70DBA9567}" type="datetimeFigureOut">
               <a:rPr lang="en-US" dirty="0"/>
               <a:pPr/>
-              <a:t>31-Oct-13</a:t>
+              <a:t>11/1/2013</a:t>
             </a:fld>
             <a:endParaRPr lang="en-US" dirty="0"/>
           </a:p>
@@ -3906,7 +3911,7 @@
             <a:fld id="{B61BEF0D-F0BB-DE4B-95CE-6DB70DBA9567}" type="datetimeFigureOut">
               <a:rPr lang="en-US" dirty="0"/>
               <a:pPr/>
-              <a:t>31-Oct-13</a:t>
+              <a:t>11/1/2013</a:t>
             </a:fld>
             <a:endParaRPr lang="en-US" dirty="0"/>
           </a:p>
@@ -3998,7 +4003,7 @@
             <a:fld id="{B61BEF0D-F0BB-DE4B-95CE-6DB70DBA9567}" type="datetimeFigureOut">
               <a:rPr lang="en-US" dirty="0"/>
               <a:pPr/>
-              <a:t>31-Oct-13</a:t>
+              <a:t>11/1/2013</a:t>
             </a:fld>
             <a:endParaRPr lang="en-US" dirty="0"/>
           </a:p>
@@ -4249,7 +4254,7 @@
           <a:p>
             <a:fld id="{42A54C80-263E-416B-A8E0-580EDEADCBDC}" type="datetimeFigureOut">
               <a:rPr lang="en-US" dirty="0"/>
-              <a:t>31-Oct-13</a:t>
+              <a:t>11/1/2013</a:t>
             </a:fld>
             <a:endParaRPr lang="en-US" dirty="0"/>
           </a:p>
@@ -4508,7 +4513,7 @@
             <a:fld id="{B61BEF0D-F0BB-DE4B-95CE-6DB70DBA9567}" type="datetimeFigureOut">
               <a:rPr lang="en-US" dirty="0"/>
               <a:pPr/>
-              <a:t>31-Oct-13</a:t>
+              <a:t>11/1/2013</a:t>
             </a:fld>
             <a:endParaRPr lang="en-US" dirty="0"/>
           </a:p>
@@ -5248,7 +5253,7 @@
             <a:fld id="{B61BEF0D-F0BB-DE4B-95CE-6DB70DBA9567}" type="datetimeFigureOut">
               <a:rPr lang="en-US" dirty="0"/>
               <a:pPr/>
-              <a:t>31-Oct-13</a:t>
+              <a:t>11/1/2013</a:t>
             </a:fld>
             <a:endParaRPr lang="en-US" dirty="0"/>
           </a:p>
@@ -5863,6 +5868,13 @@
   <p:clrMapOvr>
     <a:masterClrMapping/>
   </p:clrMapOvr>
+  <p:timing>
+    <p:tnLst>
+      <p:par>
+        <p:cTn id="1" dur="indefinite" restart="never" nodeType="tmRoot"/>
+      </p:par>
+    </p:tnLst>
+  </p:timing>
 </p:sld>
 </file>
 
@@ -5919,32 +5931,32 @@
         <p:spPr/>
         <p:txBody>
           <a:bodyPr>
-            <a:normAutofit fontScale="92500" lnSpcReduction="20000"/>
+            <a:normAutofit/>
           </a:bodyPr>
           <a:lstStyle/>
           <a:p>
+            <a:pPr marL="0" indent="0">
+              <a:buNone/>
+            </a:pPr>
+            <a:endParaRPr lang="en-US" dirty="0" smtClean="0"/>
+          </a:p>
+          <a:p>
             <a:r>
               <a:rPr lang="en-US" dirty="0" smtClean="0"/>
-              <a:t>Start Screen</a:t>
-            </a:r>
-          </a:p>
-          <a:p>
+              <a:t>Camera </a:t>
+            </a:r>
             <a:r>
               <a:rPr lang="en-US" dirty="0" smtClean="0"/>
-              <a:t>Camera Movement</a:t>
-            </a:r>
+              <a:t>Movement- various camera modes for perfect views</a:t>
+            </a:r>
+            <a:endParaRPr lang="en-US" dirty="0" smtClean="0"/>
           </a:p>
           <a:p>
             <a:r>
               <a:rPr lang="en-US" dirty="0" smtClean="0"/>
-              <a:t>Maze input format</a:t>
-            </a:r>
-          </a:p>
-          <a:p>
-            <a:r>
-              <a:rPr lang="en-US" dirty="0" smtClean="0"/>
-              <a:t>Maze drawn</a:t>
-            </a:r>
+              <a:t>Maze- maze design, input format and rendering</a:t>
+            </a:r>
+            <a:endParaRPr lang="en-US" dirty="0" smtClean="0"/>
           </a:p>
           <a:p>
             <a:r>
@@ -5953,30 +5965,24 @@
             </a:r>
             <a:r>
               <a:rPr lang="en-US" dirty="0" smtClean="0"/>
-              <a:t> Model drawn</a:t>
-            </a:r>
-          </a:p>
-          <a:p>
-            <a:r>
-              <a:rPr lang="en-US" dirty="0" err="1" smtClean="0"/>
-              <a:t>Pacman</a:t>
+              <a:t>-</a:t>
+            </a:r>
+            <a:r>
+              <a:rPr lang="en-US" dirty="0"/>
+              <a:t> </a:t>
             </a:r>
             <a:r>
               <a:rPr lang="en-US" dirty="0" smtClean="0"/>
-              <a:t> Movement</a:t>
-            </a:r>
+              <a:t>model and movement </a:t>
+            </a:r>
+            <a:endParaRPr lang="en-US" dirty="0" smtClean="0"/>
           </a:p>
           <a:p>
             <a:r>
               <a:rPr lang="en-US" dirty="0" smtClean="0"/>
-              <a:t>Ghost Model drawn</a:t>
-            </a:r>
-          </a:p>
-          <a:p>
-            <a:r>
-              <a:rPr lang="en-US" dirty="0" smtClean="0"/>
-              <a:t>Ghost Movement drawn</a:t>
-            </a:r>
+              <a:t>Ghosts- model</a:t>
+            </a:r>
+            <a:endParaRPr lang="en-US" dirty="0" smtClean="0"/>
           </a:p>
           <a:p>
             <a:r>
@@ -6014,6 +6020,13 @@
   <p:clrMapOvr>
     <a:masterClrMapping/>
   </p:clrMapOvr>
+  <p:timing>
+    <p:tnLst>
+      <p:par>
+        <p:cTn id="1" dur="indefinite" restart="never" nodeType="tmRoot"/>
+      </p:par>
+    </p:tnLst>
+  </p:timing>
 </p:sld>
 </file>
 

</xml_diff>